<commit_message>
Added recommendation to the PPT
</commit_message>
<xml_diff>
--- a/presentation/Predicting Loss-Making Firms Using Administrative Tax Data.pptx
+++ b/presentation/Predicting Loss-Making Firms Using Administrative Tax Data.pptx
@@ -15,6 +15,7 @@
     <p:sldId id="267" r:id="rId9"/>
     <p:sldId id="264" r:id="rId10"/>
     <p:sldId id="268" r:id="rId11"/>
+    <p:sldId id="269" r:id="rId12"/>
   </p:sldIdLst>
   <p:sldSz cx="12192000" cy="6858000"/>
   <p:notesSz cx="6858000" cy="9144000"/>
@@ -113,6 +114,11 @@
       </a:defRPr>
     </a:lvl9pPr>
   </p:defaultTextStyle>
+  <p:extLst>
+    <p:ext uri="{EFAFB233-063F-42B5-8137-9DF3F51BA10A}">
+      <p15:sldGuideLst xmlns:p15="http://schemas.microsoft.com/office/powerpoint/2012/main"/>
+    </p:ext>
+  </p:extLst>
 </p:presentation>
 </file>
 
@@ -4122,7 +4128,7 @@
 </p:sld>
 </file>
 
-<file path=ppt/slides/slide2.xml><?xml version="1.0" encoding="utf-8"?>
+<file path=ppt/slides/slide11.xml><?xml version="1.0" encoding="utf-8"?>
 <p:sld xmlns:a="http://schemas.openxmlformats.org/drawingml/2006/main" xmlns:r="http://schemas.openxmlformats.org/officeDocument/2006/relationships" xmlns:p="http://schemas.openxmlformats.org/presentationml/2006/main">
   <p:cSld>
     <p:bg>
@@ -4138,7 +4144,7 @@
         <p:cNvPr id="1" name="">
           <a:extLst>
             <a:ext uri="{FF2B5EF4-FFF2-40B4-BE49-F238E27FC236}">
-              <a16:creationId xmlns:a16="http://schemas.microsoft.com/office/drawing/2014/main" id="{E2BCD464-4126-8C62-A50D-134B81FD3739}"/>
+              <a16:creationId xmlns:a16="http://schemas.microsoft.com/office/drawing/2014/main" id="{6393EB87-2D49-4489-75C4-C9592FF10449}"/>
             </a:ext>
           </a:extLst>
         </p:cNvPr>
@@ -4158,7 +4164,7 @@
           <p:cNvPr id="9" name="Rectangle 8">
             <a:extLst>
               <a:ext uri="{FF2B5EF4-FFF2-40B4-BE49-F238E27FC236}">
-                <a16:creationId xmlns:a16="http://schemas.microsoft.com/office/drawing/2014/main" id="{AD29B27A-FF34-ECBE-2D3D-22DBA0882D4F}"/>
+                <a16:creationId xmlns:a16="http://schemas.microsoft.com/office/drawing/2014/main" id="{4AC0F73E-594A-435F-3332-BA8D7E54A16E}"/>
               </a:ext>
               <a:ext uri="{C183D7F6-B498-43B3-948B-1728B52AA6E4}">
                 <adec:decorative xmlns:adec="http://schemas.microsoft.com/office/drawing/2017/decorative" val="1"/>
@@ -4234,7 +4240,7 @@
           <p:cNvPr id="2" name="Title 1">
             <a:extLst>
               <a:ext uri="{FF2B5EF4-FFF2-40B4-BE49-F238E27FC236}">
-                <a16:creationId xmlns:a16="http://schemas.microsoft.com/office/drawing/2014/main" id="{98283A1A-B034-EBB0-22D8-8A41ADF21903}"/>
+                <a16:creationId xmlns:a16="http://schemas.microsoft.com/office/drawing/2014/main" id="{5371971C-8247-6113-2FA0-8BE7A955E8C5}"/>
               </a:ext>
             </a:extLst>
           </p:cNvPr>
@@ -4247,8 +4253,8 @@
         </p:nvSpPr>
         <p:spPr>
           <a:xfrm>
-            <a:off x="-1" y="0"/>
-            <a:ext cx="12191999" cy="414557"/>
+            <a:off x="-2" y="32527"/>
+            <a:ext cx="12191999" cy="402766"/>
           </a:xfrm>
           <a:solidFill>
             <a:srgbClr val="00B0F0"/>
@@ -4266,7 +4272,7 @@
                   <a:schemeClr val="bg1"/>
                 </a:solidFill>
               </a:rPr>
-              <a:t>Purpose and Policy Context</a:t>
+              <a:t>STRATEGIC RECOMMENDATIONS</a:t>
             </a:r>
           </a:p>
         </p:txBody>
@@ -4276,7 +4282,7 @@
           <p:cNvPr id="11" name="Straight Connector 10">
             <a:extLst>
               <a:ext uri="{FF2B5EF4-FFF2-40B4-BE49-F238E27FC236}">
-                <a16:creationId xmlns:a16="http://schemas.microsoft.com/office/drawing/2014/main" id="{70D3AC0E-7364-6BA4-51A2-1DECD95FD669}"/>
+                <a16:creationId xmlns:a16="http://schemas.microsoft.com/office/drawing/2014/main" id="{3FEC5A9E-36DD-303E-9B3D-5AA54AE26BC6}"/>
               </a:ext>
               <a:ext uri="{C183D7F6-B498-43B3-948B-1728B52AA6E4}">
                 <adec:decorative xmlns:adec="http://schemas.microsoft.com/office/drawing/2017/decorative" val="1"/>
@@ -4323,12 +4329,280 @@
           </a:fontRef>
         </p:style>
       </p:cxnSp>
+      <p:sp>
+        <p:nvSpPr>
+          <p:cNvPr id="12" name="TextBox 11">
+            <a:extLst>
+              <a:ext uri="{FF2B5EF4-FFF2-40B4-BE49-F238E27FC236}">
+                <a16:creationId xmlns:a16="http://schemas.microsoft.com/office/drawing/2014/main" id="{F20302B9-182F-CF61-5A10-CDF38DDB7BB2}"/>
+              </a:ext>
+            </a:extLst>
+          </p:cNvPr>
+          <p:cNvSpPr txBox="1"/>
+          <p:nvPr/>
+        </p:nvSpPr>
+        <p:spPr>
+          <a:xfrm>
+            <a:off x="0" y="435293"/>
+            <a:ext cx="5288134" cy="2416046"/>
+          </a:xfrm>
+          <a:prstGeom prst="rect">
+            <a:avLst/>
+          </a:prstGeom>
+          <a:solidFill>
+            <a:schemeClr val="accent1">
+              <a:lumMod val="40000"/>
+              <a:lumOff val="60000"/>
+            </a:schemeClr>
+          </a:solidFill>
+        </p:spPr>
+        <p:txBody>
+          <a:bodyPr wrap="square">
+            <a:spAutoFit/>
+          </a:bodyPr>
+          <a:lstStyle/>
+          <a:p>
+            <a:pPr>
+              <a:spcBef>
+                <a:spcPts val="600"/>
+              </a:spcBef>
+              <a:spcAft>
+                <a:spcPts val="600"/>
+              </a:spcAft>
+            </a:pPr>
+            <a:r>
+              <a:rPr lang="en-US" sz="1400" b="1" dirty="0">
+                <a:latin typeface="Times New Roman" panose="02020603050405020304" pitchFamily="18" charset="0"/>
+                <a:cs typeface="Times New Roman" panose="02020603050405020304" pitchFamily="18" charset="0"/>
+              </a:rPr>
+              <a:t>1. Operational Implementation</a:t>
+            </a:r>
+          </a:p>
+          <a:p>
+            <a:pPr marL="285750" indent="-285750">
+              <a:spcBef>
+                <a:spcPts val="600"/>
+              </a:spcBef>
+              <a:buFont typeface="Wingdings" panose="05000000000000000000" pitchFamily="2" charset="2"/>
+              <a:buChar char="q"/>
+            </a:pPr>
+            <a:r>
+              <a:rPr lang="en-US" sz="1400" dirty="0">
+                <a:latin typeface="Times New Roman" panose="02020603050405020304" pitchFamily="18" charset="0"/>
+                <a:cs typeface="Times New Roman" panose="02020603050405020304" pitchFamily="18" charset="0"/>
+              </a:rPr>
+              <a:t>Adopt </a:t>
+            </a:r>
+            <a:r>
+              <a:rPr lang="en-US" sz="1400" dirty="0" err="1">
+                <a:latin typeface="Times New Roman" panose="02020603050405020304" pitchFamily="18" charset="0"/>
+                <a:cs typeface="Times New Roman" panose="02020603050405020304" pitchFamily="18" charset="0"/>
+              </a:rPr>
+              <a:t>XGBoost</a:t>
+            </a:r>
+            <a:r>
+              <a:rPr lang="en-US" sz="1400" dirty="0">
+                <a:latin typeface="Times New Roman" panose="02020603050405020304" pitchFamily="18" charset="0"/>
+                <a:cs typeface="Times New Roman" panose="02020603050405020304" pitchFamily="18" charset="0"/>
+              </a:rPr>
+              <a:t>: Deploy the optimized model as the standard for loss-risk scoring to leverage its superior non-linear discrimination.</a:t>
+            </a:r>
+          </a:p>
+          <a:p>
+            <a:pPr marL="285750" indent="-285750">
+              <a:spcBef>
+                <a:spcPts val="600"/>
+              </a:spcBef>
+              <a:buFont typeface="Wingdings" panose="05000000000000000000" pitchFamily="2" charset="2"/>
+              <a:buChar char="q"/>
+            </a:pPr>
+            <a:r>
+              <a:rPr lang="en-US" sz="1400" dirty="0">
+                <a:latin typeface="Times New Roman" panose="02020603050405020304" pitchFamily="18" charset="0"/>
+                <a:cs typeface="Times New Roman" panose="02020603050405020304" pitchFamily="18" charset="0"/>
+              </a:rPr>
+              <a:t>Risk Banding: Shift form binary “Loss/Non-loss” flags to predicted probability bands for smarter audit prioritization and resource allocation.</a:t>
+            </a:r>
+          </a:p>
+          <a:p>
+            <a:pPr marL="285750" indent="-285750">
+              <a:spcBef>
+                <a:spcPts val="600"/>
+              </a:spcBef>
+              <a:buFont typeface="Wingdings" panose="05000000000000000000" pitchFamily="2" charset="2"/>
+              <a:buChar char="q"/>
+            </a:pPr>
+            <a:r>
+              <a:rPr lang="en-US" sz="1400" dirty="0">
+                <a:latin typeface="Times New Roman" panose="02020603050405020304" pitchFamily="18" charset="0"/>
+                <a:cs typeface="Times New Roman" panose="02020603050405020304" pitchFamily="18" charset="0"/>
+              </a:rPr>
+              <a:t>Forward-Looking Monitoring: Embed the model into revenue monitoring to identify emerging loss clusters early.</a:t>
+            </a:r>
+          </a:p>
+          <a:p>
+            <a:pPr>
+              <a:spcBef>
+                <a:spcPts val="600"/>
+              </a:spcBef>
+              <a:spcAft>
+                <a:spcPts val="600"/>
+              </a:spcAft>
+            </a:pPr>
+            <a:endParaRPr lang="en-US" sz="1400" b="1" dirty="0">
+              <a:latin typeface="Times New Roman" panose="02020603050405020304" pitchFamily="18" charset="0"/>
+              <a:cs typeface="Times New Roman" panose="02020603050405020304" pitchFamily="18" charset="0"/>
+            </a:endParaRPr>
+          </a:p>
+        </p:txBody>
+      </p:sp>
+      <p:sp>
+        <p:nvSpPr>
+          <p:cNvPr id="4" name="TextBox 3">
+            <a:extLst>
+              <a:ext uri="{FF2B5EF4-FFF2-40B4-BE49-F238E27FC236}">
+                <a16:creationId xmlns:a16="http://schemas.microsoft.com/office/drawing/2014/main" id="{A12F5121-436F-192B-DEF2-0491A47E49C3}"/>
+              </a:ext>
+            </a:extLst>
+          </p:cNvPr>
+          <p:cNvSpPr txBox="1"/>
+          <p:nvPr/>
+        </p:nvSpPr>
+        <p:spPr>
+          <a:xfrm>
+            <a:off x="-2" y="3646646"/>
+            <a:ext cx="5288134" cy="2846933"/>
+          </a:xfrm>
+          <a:prstGeom prst="rect">
+            <a:avLst/>
+          </a:prstGeom>
+          <a:solidFill>
+            <a:schemeClr val="accent1">
+              <a:lumMod val="40000"/>
+              <a:lumOff val="60000"/>
+            </a:schemeClr>
+          </a:solidFill>
+        </p:spPr>
+        <p:txBody>
+          <a:bodyPr wrap="square">
+            <a:spAutoFit/>
+          </a:bodyPr>
+          <a:lstStyle/>
+          <a:p>
+            <a:pPr>
+              <a:spcBef>
+                <a:spcPts val="600"/>
+              </a:spcBef>
+              <a:spcAft>
+                <a:spcPts val="600"/>
+              </a:spcAft>
+            </a:pPr>
+            <a:r>
+              <a:rPr lang="en-US" sz="1400" b="1" dirty="0">
+                <a:latin typeface="Times New Roman" panose="02020603050405020304" pitchFamily="18" charset="0"/>
+                <a:cs typeface="Times New Roman" panose="02020603050405020304" pitchFamily="18" charset="0"/>
+              </a:rPr>
+              <a:t>2. Policy &amp; Compliance Re-Orientation</a:t>
+            </a:r>
+          </a:p>
+          <a:p>
+            <a:pPr marL="285750" indent="-285750">
+              <a:spcBef>
+                <a:spcPts val="600"/>
+              </a:spcBef>
+              <a:buFont typeface="Wingdings" panose="05000000000000000000" pitchFamily="2" charset="2"/>
+              <a:buChar char="q"/>
+            </a:pPr>
+            <a:r>
+              <a:rPr lang="en-US" sz="1400" dirty="0">
+                <a:latin typeface="Times New Roman" panose="02020603050405020304" pitchFamily="18" charset="0"/>
+                <a:cs typeface="Times New Roman" panose="02020603050405020304" pitchFamily="18" charset="0"/>
+              </a:rPr>
+              <a:t>Refine Risk Profiling: Move away from “firm size” as a primary risk proxy. Focus instead on cost structure indicators (</a:t>
+            </a:r>
+            <a:r>
+              <a:rPr lang="en-US" sz="1400" dirty="0" err="1">
+                <a:latin typeface="Times New Roman" panose="02020603050405020304" pitchFamily="18" charset="0"/>
+                <a:cs typeface="Times New Roman" panose="02020603050405020304" pitchFamily="18" charset="0"/>
+              </a:rPr>
+              <a:t>eg</a:t>
+            </a:r>
+            <a:r>
+              <a:rPr lang="en-US" sz="1400" dirty="0">
+                <a:latin typeface="Times New Roman" panose="02020603050405020304" pitchFamily="18" charset="0"/>
+                <a:cs typeface="Times New Roman" panose="02020603050405020304" pitchFamily="18" charset="0"/>
+              </a:rPr>
+              <a:t>, </a:t>
+            </a:r>
+            <a:r>
+              <a:rPr lang="en-US" sz="1400" dirty="0" err="1">
+                <a:latin typeface="Times New Roman" panose="02020603050405020304" pitchFamily="18" charset="0"/>
+                <a:cs typeface="Times New Roman" panose="02020603050405020304" pitchFamily="18" charset="0"/>
+              </a:rPr>
+              <a:t>efficieny</a:t>
+            </a:r>
+            <a:r>
+              <a:rPr lang="en-US" sz="1400" dirty="0">
+                <a:latin typeface="Times New Roman" panose="02020603050405020304" pitchFamily="18" charset="0"/>
+                <a:cs typeface="Times New Roman" panose="02020603050405020304" pitchFamily="18" charset="0"/>
+              </a:rPr>
+              <a:t> ratios) regardless of turnover.</a:t>
+            </a:r>
+          </a:p>
+          <a:p>
+            <a:pPr marL="285750" indent="-285750">
+              <a:spcBef>
+                <a:spcPts val="600"/>
+              </a:spcBef>
+              <a:buFont typeface="Wingdings" panose="05000000000000000000" pitchFamily="2" charset="2"/>
+              <a:buChar char="q"/>
+            </a:pPr>
+            <a:r>
+              <a:rPr lang="en-US" sz="1400" dirty="0">
+                <a:latin typeface="Times New Roman" panose="02020603050405020304" pitchFamily="18" charset="0"/>
+                <a:cs typeface="Times New Roman" panose="02020603050405020304" pitchFamily="18" charset="0"/>
+              </a:rPr>
+              <a:t>Sector-Specific Thresholds: Establish distinct risk benchmarks for high-risk sectors (Construction, Real estate, Manufacturing) where loss propensity is naturally higher.</a:t>
+            </a:r>
+          </a:p>
+          <a:p>
+            <a:pPr marL="285750" indent="-285750">
+              <a:spcBef>
+                <a:spcPts val="600"/>
+              </a:spcBef>
+              <a:buFont typeface="Wingdings" panose="05000000000000000000" pitchFamily="2" charset="2"/>
+              <a:buChar char="q"/>
+            </a:pPr>
+            <a:r>
+              <a:rPr lang="en-US" sz="1400" dirty="0">
+                <a:latin typeface="Times New Roman" panose="02020603050405020304" pitchFamily="18" charset="0"/>
+                <a:cs typeface="Times New Roman" panose="02020603050405020304" pitchFamily="18" charset="0"/>
+              </a:rPr>
+              <a:t>Target Enforcement: Complement broad policies (like minimum tax) with model-driven audits targeting firms with persistent, economically implausible loss patterns.</a:t>
+            </a:r>
+          </a:p>
+          <a:p>
+            <a:pPr>
+              <a:spcBef>
+                <a:spcPts val="600"/>
+              </a:spcBef>
+              <a:spcAft>
+                <a:spcPts val="600"/>
+              </a:spcAft>
+            </a:pPr>
+            <a:endParaRPr lang="en-US" sz="1400" b="1" dirty="0">
+              <a:latin typeface="Times New Roman" panose="02020603050405020304" pitchFamily="18" charset="0"/>
+              <a:cs typeface="Times New Roman" panose="02020603050405020304" pitchFamily="18" charset="0"/>
+            </a:endParaRPr>
+          </a:p>
+        </p:txBody>
+      </p:sp>
       <p:pic>
         <p:nvPicPr>
-          <p:cNvPr id="18" name="Picture 17">
-            <a:extLst>
-              <a:ext uri="{FF2B5EF4-FFF2-40B4-BE49-F238E27FC236}">
-                <a16:creationId xmlns:a16="http://schemas.microsoft.com/office/drawing/2014/main" id="{DEA8856E-2C40-7DC1-6005-F25715924ED5}"/>
+          <p:cNvPr id="7" name="Picture 6">
+            <a:extLst>
+              <a:ext uri="{FF2B5EF4-FFF2-40B4-BE49-F238E27FC236}">
+                <a16:creationId xmlns:a16="http://schemas.microsoft.com/office/drawing/2014/main" id="{69D7DF03-D07D-9B43-B3BC-7958F026D507}"/>
               </a:ext>
             </a:extLst>
           </p:cNvPr>
@@ -4345,14 +4619,258 @@
         </p:blipFill>
         <p:spPr>
           <a:xfrm>
-            <a:off x="-3" y="414557"/>
-            <a:ext cx="5161725" cy="3294973"/>
+            <a:off x="7049386" y="496158"/>
+            <a:ext cx="4475101" cy="2416045"/>
           </a:xfrm>
           <a:prstGeom prst="rect">
             <a:avLst/>
           </a:prstGeom>
         </p:spPr>
       </p:pic>
+      <p:pic>
+        <p:nvPicPr>
+          <p:cNvPr id="10" name="Picture 9">
+            <a:extLst>
+              <a:ext uri="{FF2B5EF4-FFF2-40B4-BE49-F238E27FC236}">
+                <a16:creationId xmlns:a16="http://schemas.microsoft.com/office/drawing/2014/main" id="{17FBF275-C221-7E99-ABAA-E194299AEC32}"/>
+              </a:ext>
+            </a:extLst>
+          </p:cNvPr>
+          <p:cNvPicPr>
+            <a:picLocks noChangeAspect="1"/>
+          </p:cNvPicPr>
+          <p:nvPr/>
+        </p:nvPicPr>
+        <p:blipFill>
+          <a:blip r:embed="rId3"/>
+          <a:stretch>
+            <a:fillRect/>
+          </a:stretch>
+        </p:blipFill>
+        <p:spPr>
+          <a:xfrm>
+            <a:off x="6834539" y="3951699"/>
+            <a:ext cx="4689948" cy="2541880"/>
+          </a:xfrm>
+          <a:prstGeom prst="rect">
+            <a:avLst/>
+          </a:prstGeom>
+        </p:spPr>
+      </p:pic>
+    </p:spTree>
+    <p:extLst>
+      <p:ext uri="{BB962C8B-B14F-4D97-AF65-F5344CB8AC3E}">
+        <p14:creationId xmlns:p14="http://schemas.microsoft.com/office/powerpoint/2010/main" val="2181740730"/>
+      </p:ext>
+    </p:extLst>
+  </p:cSld>
+  <p:clrMapOvr>
+    <a:masterClrMapping/>
+  </p:clrMapOvr>
+</p:sld>
+</file>
+
+<file path=ppt/slides/slide2.xml><?xml version="1.0" encoding="utf-8"?>
+<p:sld xmlns:a="http://schemas.openxmlformats.org/drawingml/2006/main" xmlns:r="http://schemas.openxmlformats.org/officeDocument/2006/relationships" xmlns:p="http://schemas.openxmlformats.org/presentationml/2006/main">
+  <p:cSld>
+    <p:bg>
+      <p:bgPr>
+        <a:solidFill>
+          <a:schemeClr val="bg1"/>
+        </a:solidFill>
+        <a:effectLst/>
+      </p:bgPr>
+    </p:bg>
+    <p:spTree>
+      <p:nvGrpSpPr>
+        <p:cNvPr id="1" name="">
+          <a:extLst>
+            <a:ext uri="{FF2B5EF4-FFF2-40B4-BE49-F238E27FC236}">
+              <a16:creationId xmlns:a16="http://schemas.microsoft.com/office/drawing/2014/main" id="{E2BCD464-4126-8C62-A50D-134B81FD3739}"/>
+            </a:ext>
+          </a:extLst>
+        </p:cNvPr>
+        <p:cNvGrpSpPr/>
+        <p:nvPr/>
+      </p:nvGrpSpPr>
+      <p:grpSpPr>
+        <a:xfrm>
+          <a:off x="0" y="0"/>
+          <a:ext cx="0" cy="0"/>
+          <a:chOff x="0" y="0"/>
+          <a:chExt cx="0" cy="0"/>
+        </a:xfrm>
+      </p:grpSpPr>
+      <p:sp useBgFill="1">
+        <p:nvSpPr>
+          <p:cNvPr id="9" name="Rectangle 8">
+            <a:extLst>
+              <a:ext uri="{FF2B5EF4-FFF2-40B4-BE49-F238E27FC236}">
+                <a16:creationId xmlns:a16="http://schemas.microsoft.com/office/drawing/2014/main" id="{AD29B27A-FF34-ECBE-2D3D-22DBA0882D4F}"/>
+              </a:ext>
+              <a:ext uri="{C183D7F6-B498-43B3-948B-1728B52AA6E4}">
+                <adec:decorative xmlns:adec="http://schemas.microsoft.com/office/drawing/2017/decorative" val="1"/>
+              </a:ext>
+            </a:extLst>
+          </p:cNvPr>
+          <p:cNvSpPr>
+            <a:spLocks noGrp="1" noRot="1" noChangeAspect="1" noMove="1" noResize="1" noEditPoints="1" noAdjustHandles="1" noChangeArrowheads="1" noChangeShapeType="1" noTextEdit="1"/>
+          </p:cNvSpPr>
+          <p:nvPr>
+            <p:extLst>
+              <p:ext uri="{386F3935-93C4-4BCD-93E2-E3B085C9AB24}">
+                <p16:designElem xmlns:p16="http://schemas.microsoft.com/office/powerpoint/2015/main" val="1"/>
+              </p:ext>
+            </p:extLst>
+          </p:nvPr>
+        </p:nvSpPr>
+        <p:spPr>
+          <a:xfrm>
+            <a:off x="0" y="0"/>
+            <a:ext cx="12192000" cy="6858000"/>
+          </a:xfrm>
+          <a:prstGeom prst="rect">
+            <a:avLst/>
+          </a:prstGeom>
+          <a:ln w="12700" cap="flat" cmpd="sng" algn="ctr">
+            <a:noFill/>
+            <a:prstDash val="solid"/>
+            <a:miter lim="800000"/>
+          </a:ln>
+          <a:effectLst/>
+          <a:extLst>
+            <a:ext uri="{91240B29-F687-4F45-9708-019B960494DF}">
+              <a14:hiddenLine xmlns:a14="http://schemas.microsoft.com/office/drawing/2010/main" w="12700" cap="flat" cmpd="sng" algn="ctr">
+                <a:solidFill>
+                  <a:schemeClr val="accent1">
+                    <a:shade val="50000"/>
+                  </a:schemeClr>
+                </a:solidFill>
+                <a:prstDash val="solid"/>
+                <a:miter lim="800000"/>
+              </a14:hiddenLine>
+            </a:ext>
+          </a:extLst>
+        </p:spPr>
+        <p:style>
+          <a:lnRef idx="2">
+            <a:schemeClr val="accent1">
+              <a:shade val="50000"/>
+            </a:schemeClr>
+          </a:lnRef>
+          <a:fillRef idx="1">
+            <a:schemeClr val="accent1"/>
+          </a:fillRef>
+          <a:effectRef idx="0">
+            <a:schemeClr val="accent1"/>
+          </a:effectRef>
+          <a:fontRef idx="minor">
+            <a:schemeClr val="lt1"/>
+          </a:fontRef>
+        </p:style>
+        <p:txBody>
+          <a:bodyPr rtlCol="0" anchor="ctr"/>
+          <a:lstStyle/>
+          <a:p>
+            <a:pPr algn="ctr"/>
+            <a:endParaRPr lang="en-US"/>
+          </a:p>
+        </p:txBody>
+      </p:sp>
+      <p:sp>
+        <p:nvSpPr>
+          <p:cNvPr id="2" name="Title 1">
+            <a:extLst>
+              <a:ext uri="{FF2B5EF4-FFF2-40B4-BE49-F238E27FC236}">
+                <a16:creationId xmlns:a16="http://schemas.microsoft.com/office/drawing/2014/main" id="{98283A1A-B034-EBB0-22D8-8A41ADF21903}"/>
+              </a:ext>
+            </a:extLst>
+          </p:cNvPr>
+          <p:cNvSpPr>
+            <a:spLocks noGrp="1"/>
+          </p:cNvSpPr>
+          <p:nvPr>
+            <p:ph type="ctrTitle"/>
+          </p:nvPr>
+        </p:nvSpPr>
+        <p:spPr>
+          <a:xfrm>
+            <a:off x="-1" y="0"/>
+            <a:ext cx="12191999" cy="414557"/>
+          </a:xfrm>
+          <a:solidFill>
+            <a:srgbClr val="00B0F0"/>
+          </a:solidFill>
+        </p:spPr>
+        <p:txBody>
+          <a:bodyPr anchor="t">
+            <a:noAutofit/>
+          </a:bodyPr>
+          <a:lstStyle/>
+          <a:p>
+            <a:r>
+              <a:rPr lang="en-US" sz="2000" dirty="0">
+                <a:solidFill>
+                  <a:schemeClr val="bg1"/>
+                </a:solidFill>
+              </a:rPr>
+              <a:t>Purpose and Policy Context</a:t>
+            </a:r>
+          </a:p>
+        </p:txBody>
+      </p:sp>
+      <p:cxnSp>
+        <p:nvCxnSpPr>
+          <p:cNvPr id="11" name="Straight Connector 10">
+            <a:extLst>
+              <a:ext uri="{FF2B5EF4-FFF2-40B4-BE49-F238E27FC236}">
+                <a16:creationId xmlns:a16="http://schemas.microsoft.com/office/drawing/2014/main" id="{70D3AC0E-7364-6BA4-51A2-1DECD95FD669}"/>
+              </a:ext>
+              <a:ext uri="{C183D7F6-B498-43B3-948B-1728B52AA6E4}">
+                <adec:decorative xmlns:adec="http://schemas.microsoft.com/office/drawing/2017/decorative" val="1"/>
+              </a:ext>
+            </a:extLst>
+          </p:cNvPr>
+          <p:cNvCxnSpPr>
+            <a:cxnSpLocks noGrp="1" noRot="1" noChangeAspect="1" noMove="1" noResize="1" noEditPoints="1" noAdjustHandles="1" noChangeArrowheads="1" noChangeShapeType="1"/>
+          </p:cNvCxnSpPr>
+          <p:nvPr>
+            <p:extLst>
+              <p:ext uri="{386F3935-93C4-4BCD-93E2-E3B085C9AB24}">
+                <p16:designElem xmlns:p16="http://schemas.microsoft.com/office/powerpoint/2015/main" val="1"/>
+              </p:ext>
+            </p:extLst>
+          </p:nvPr>
+        </p:nvCxnSpPr>
+        <p:spPr>
+          <a:xfrm>
+            <a:off x="0" y="1207120"/>
+            <a:ext cx="804195" cy="0"/>
+          </a:xfrm>
+          <a:prstGeom prst="line">
+            <a:avLst/>
+          </a:prstGeom>
+          <a:ln w="123825">
+            <a:solidFill>
+              <a:schemeClr val="tx1"/>
+            </a:solidFill>
+          </a:ln>
+        </p:spPr>
+        <p:style>
+          <a:lnRef idx="1">
+            <a:schemeClr val="accent1"/>
+          </a:lnRef>
+          <a:fillRef idx="0">
+            <a:schemeClr val="accent1"/>
+          </a:fillRef>
+          <a:effectRef idx="0">
+            <a:schemeClr val="accent1"/>
+          </a:effectRef>
+          <a:fontRef idx="minor">
+            <a:schemeClr val="tx1"/>
+          </a:fontRef>
+        </p:style>
+      </p:cxnSp>
       <p:grpSp>
         <p:nvGrpSpPr>
           <p:cNvPr id="23" name="Group 22">
@@ -4889,6 +5407,36 @@
           </p:txBody>
         </p:sp>
       </p:grpSp>
+      <p:pic>
+        <p:nvPicPr>
+          <p:cNvPr id="4" name="Picture 3">
+            <a:extLst>
+              <a:ext uri="{FF2B5EF4-FFF2-40B4-BE49-F238E27FC236}">
+                <a16:creationId xmlns:a16="http://schemas.microsoft.com/office/drawing/2014/main" id="{04E37070-7554-4F96-A6E7-7FE888601345}"/>
+              </a:ext>
+            </a:extLst>
+          </p:cNvPr>
+          <p:cNvPicPr>
+            <a:picLocks noChangeAspect="1"/>
+          </p:cNvPicPr>
+          <p:nvPr/>
+        </p:nvPicPr>
+        <p:blipFill>
+          <a:blip r:embed="rId2"/>
+          <a:stretch>
+            <a:fillRect/>
+          </a:stretch>
+        </p:blipFill>
+        <p:spPr>
+          <a:xfrm>
+            <a:off x="1" y="414557"/>
+            <a:ext cx="5254486" cy="3338095"/>
+          </a:xfrm>
+          <a:prstGeom prst="rect">
+            <a:avLst/>
+          </a:prstGeom>
+        </p:spPr>
+      </p:pic>
     </p:spTree>
     <p:extLst>
       <p:ext uri="{BB962C8B-B14F-4D97-AF65-F5344CB8AC3E}">
@@ -5146,8 +5694,8 @@
         </p:blipFill>
         <p:spPr>
           <a:xfrm>
-            <a:off x="6576665" y="968544"/>
-            <a:ext cx="4218694" cy="3210835"/>
+            <a:off x="6356074" y="1302807"/>
+            <a:ext cx="5569563" cy="4478561"/>
           </a:xfrm>
           <a:prstGeom prst="rect">
             <a:avLst/>
@@ -8236,7 +8784,7 @@
         </p:blipFill>
         <p:spPr>
           <a:xfrm>
-            <a:off x="53009" y="802932"/>
+            <a:off x="3849" y="802932"/>
             <a:ext cx="3544956" cy="3440941"/>
           </a:xfrm>
           <a:prstGeom prst="rect">
@@ -8266,8 +8814,8 @@
         </p:blipFill>
         <p:spPr>
           <a:xfrm>
-            <a:off x="4716671" y="842211"/>
-            <a:ext cx="3102111" cy="3286135"/>
+            <a:off x="4657679" y="842211"/>
+            <a:ext cx="3211168" cy="3401662"/>
           </a:xfrm>
           <a:prstGeom prst="rect">
             <a:avLst/>
@@ -8296,8 +8844,8 @@
         </p:blipFill>
         <p:spPr>
           <a:xfrm>
-            <a:off x="8788133" y="780220"/>
-            <a:ext cx="2999677" cy="3154619"/>
+            <a:off x="8788133" y="809716"/>
+            <a:ext cx="3326623" cy="3498453"/>
           </a:xfrm>
           <a:prstGeom prst="rect">
             <a:avLst/>

</xml_diff>